<commit_message>
Updated all working practices presentations.
</commit_message>
<xml_diff>
--- a/working_practices/Algorithmic_thinking.pptx
+++ b/working_practices/Algorithmic_thinking.pptx
@@ -6,7 +6,7 @@
     <p:sldMasterId id="2147483700" r:id="rId2"/>
   </p:sldMasterIdLst>
   <p:notesMasterIdLst>
-    <p:notesMasterId r:id="rId20"/>
+    <p:notesMasterId r:id="rId19"/>
   </p:notesMasterIdLst>
   <p:sldIdLst>
     <p:sldId id="256" r:id="rId3"/>
@@ -25,7 +25,6 @@
     <p:sldId id="278" r:id="rId16"/>
     <p:sldId id="265" r:id="rId17"/>
     <p:sldId id="263" r:id="rId18"/>
-    <p:sldId id="279" r:id="rId19"/>
   </p:sldIdLst>
   <p:sldSz cx="9144000" cy="6858000" type="screen4x3"/>
   <p:notesSz cx="6858000" cy="9144000"/>
@@ -225,7 +224,7 @@
           <a:p>
             <a:fld id="{602A5C54-88BD-4264-8EA7-A39AC167FEFC}" type="datetimeFigureOut">
               <a:rPr lang="en-GB" smtClean="0"/>
-              <a:t>24/10/2018</a:t>
+              <a:t>12/11/2019</a:t>
             </a:fld>
             <a:endParaRPr lang="en-GB"/>
           </a:p>
@@ -2096,7 +2095,7 @@
                 </a:solidFill>
               </a:rPr>
               <a:pPr/>
-              <a:t>24/10/2018</a:t>
+              <a:t>12/11/2019</a:t>
             </a:fld>
             <a:endParaRPr lang="en-GB">
               <a:solidFill>
@@ -2223,7 +2222,7 @@
                 </a:solidFill>
               </a:rPr>
               <a:pPr/>
-              <a:t>24/10/2018</a:t>
+              <a:t>12/11/2019</a:t>
             </a:fld>
             <a:endParaRPr lang="en-GB">
               <a:solidFill>
@@ -3420,7 +3419,7 @@
                 </a:solidFill>
               </a:rPr>
               <a:pPr/>
-              <a:t>24/10/2018</a:t>
+              <a:t>12/11/2019</a:t>
             </a:fld>
             <a:endParaRPr lang="en-GB">
               <a:solidFill>
@@ -8958,11 +8957,7 @@
             </a:pPr>
             <a:r>
               <a:rPr lang="en-GB" sz="2800" dirty="0" smtClean="0"/>
-              <a:t>Imagine you are entertaining a small group of visitors at your workplace. Your task is to serve them each a hot drink from a dispensing machine. Use pseudocode to construct a suitable algorithm for performing this task</a:t>
-            </a:r>
-            <a:r>
-              <a:rPr lang="en-GB" sz="2800" dirty="0" smtClean="0"/>
-              <a:t>. </a:t>
+              <a:t>Imagine you are entertaining a small group of visitors at your workplace. Your task is to serve them each a hot drink from a dispensing machine. Use pseudocode to construct a suitable algorithm for performing this task. </a:t>
             </a:r>
             <a:endParaRPr lang="en-GB" sz="2800" dirty="0"/>
           </a:p>
@@ -9179,239 +9174,6 @@
     <p:extLst>
       <p:ext uri="{BB962C8B-B14F-4D97-AF65-F5344CB8AC3E}">
         <p14:creationId xmlns:p14="http://schemas.microsoft.com/office/powerpoint/2010/main" val="2471078060"/>
-      </p:ext>
-    </p:extLst>
-  </p:cSld>
-  <p:clrMapOvr>
-    <a:masterClrMapping/>
-  </p:clrMapOvr>
-  <mc:AlternateContent xmlns:mc="http://schemas.openxmlformats.org/markup-compatibility/2006" xmlns:p14="http://schemas.microsoft.com/office/powerpoint/2010/main">
-    <mc:Choice Requires="p14">
-      <p:transition spd="slow" p14:dur="2000"/>
-    </mc:Choice>
-    <mc:Fallback xmlns="">
-      <p:transition spd="slow"/>
-    </mc:Fallback>
-  </mc:AlternateContent>
-  <p:timing>
-    <p:tnLst>
-      <p:par>
-        <p:cTn id="1" dur="indefinite" restart="never" nodeType="tmRoot"/>
-      </p:par>
-    </p:tnLst>
-  </p:timing>
-</p:sld>
-</file>
-
-<file path=ppt/slides/slide17.xml><?xml version="1.0" encoding="utf-8"?>
-<p:sld xmlns:a="http://schemas.openxmlformats.org/drawingml/2006/main" xmlns:r="http://schemas.openxmlformats.org/officeDocument/2006/relationships" xmlns:p="http://schemas.openxmlformats.org/presentationml/2006/main">
-  <p:cSld>
-    <p:spTree>
-      <p:nvGrpSpPr>
-        <p:cNvPr id="1" name=""/>
-        <p:cNvGrpSpPr/>
-        <p:nvPr/>
-      </p:nvGrpSpPr>
-      <p:grpSpPr>
-        <a:xfrm>
-          <a:off x="0" y="0"/>
-          <a:ext cx="0" cy="0"/>
-          <a:chOff x="0" y="0"/>
-          <a:chExt cx="0" cy="0"/>
-        </a:xfrm>
-      </p:grpSpPr>
-      <p:sp>
-        <p:nvSpPr>
-          <p:cNvPr id="2" name="Title 1"/>
-          <p:cNvSpPr>
-            <a:spLocks noGrp="1"/>
-          </p:cNvSpPr>
-          <p:nvPr>
-            <p:ph type="title"/>
-          </p:nvPr>
-        </p:nvSpPr>
-        <p:spPr>
-          <a:xfrm>
-            <a:off x="2322304" y="332656"/>
-            <a:ext cx="3977888" cy="720080"/>
-          </a:xfrm>
-        </p:spPr>
-        <p:txBody>
-          <a:bodyPr>
-            <a:normAutofit/>
-          </a:bodyPr>
-          <a:lstStyle/>
-          <a:p>
-            <a:r>
-              <a:rPr lang="en-GB" b="1" dirty="0" smtClean="0">
-                <a:solidFill>
-                  <a:schemeClr val="tx1"/>
-                </a:solidFill>
-                <a:latin typeface="Arial Rounded MT Bold" panose="020F0704030504030204" pitchFamily="34" charset="0"/>
-              </a:rPr>
-              <a:t>Starting to code</a:t>
-            </a:r>
-            <a:endParaRPr lang="en-GB" b="1" dirty="0">
-              <a:solidFill>
-                <a:schemeClr val="tx1"/>
-              </a:solidFill>
-              <a:latin typeface="Arial Rounded MT Bold" panose="020F0704030504030204" pitchFamily="34" charset="0"/>
-            </a:endParaRPr>
-          </a:p>
-        </p:txBody>
-      </p:sp>
-      <p:sp>
-        <p:nvSpPr>
-          <p:cNvPr id="3" name="Content Placeholder 2"/>
-          <p:cNvSpPr>
-            <a:spLocks noGrp="1"/>
-          </p:cNvSpPr>
-          <p:nvPr>
-            <p:ph idx="1"/>
-          </p:nvPr>
-        </p:nvSpPr>
-        <p:spPr>
-          <a:xfrm>
-            <a:off x="467544" y="1124744"/>
-            <a:ext cx="8496944" cy="4625712"/>
-          </a:xfrm>
-        </p:spPr>
-        <p:txBody>
-          <a:bodyPr/>
-          <a:lstStyle/>
-          <a:p>
-            <a:pPr marL="0" indent="0">
-              <a:buNone/>
-            </a:pPr>
-            <a:r>
-              <a:rPr lang="en-GB" sz="2800" dirty="0" smtClean="0"/>
-              <a:t>Many online interactive tutorials, for example</a:t>
-            </a:r>
-            <a:r>
-              <a:rPr lang="en-GB" sz="2800" dirty="0" smtClean="0"/>
-              <a:t>:</a:t>
-            </a:r>
-          </a:p>
-          <a:p>
-            <a:pPr marL="0" indent="0">
-              <a:buNone/>
-            </a:pPr>
-            <a:endParaRPr lang="en-GB" sz="1200" dirty="0"/>
-          </a:p>
-          <a:p>
-            <a:pPr marL="457200" indent="-457200">
-              <a:buFont typeface="Arial" panose="020B0604020202020204" pitchFamily="34" charset="0"/>
-              <a:buChar char="•"/>
-            </a:pPr>
-            <a:r>
-              <a:rPr lang="en-GB" sz="2800" dirty="0" smtClean="0"/>
-              <a:t>scratch </a:t>
-            </a:r>
-            <a:r>
-              <a:rPr lang="en-GB" sz="2800" dirty="0">
-                <a:solidFill>
-                  <a:srgbClr val="FF0000"/>
-                </a:solidFill>
-                <a:hlinkClick r:id="rId2"/>
-              </a:rPr>
-              <a:t>https://scratc</a:t>
-            </a:r>
-            <a:r>
-              <a:rPr lang="en-GB" sz="2800" dirty="0">
-                <a:solidFill>
-                  <a:srgbClr val="0066CC"/>
-                </a:solidFill>
-                <a:hlinkClick r:id="rId2"/>
-              </a:rPr>
-              <a:t>h.mi</a:t>
-            </a:r>
-            <a:r>
-              <a:rPr lang="en-GB" sz="2800" dirty="0">
-                <a:solidFill>
-                  <a:srgbClr val="FF0000"/>
-                </a:solidFill>
-                <a:hlinkClick r:id="rId2"/>
-              </a:rPr>
-              <a:t>t.edu</a:t>
-            </a:r>
-            <a:r>
-              <a:rPr lang="en-GB" sz="2800" dirty="0" smtClean="0">
-                <a:hlinkClick r:id="rId2"/>
-              </a:rPr>
-              <a:t>/</a:t>
-            </a:r>
-            <a:endParaRPr lang="en-GB" sz="2800" dirty="0" smtClean="0"/>
-          </a:p>
-          <a:p>
-            <a:pPr marL="457200" indent="-457200">
-              <a:buFont typeface="Arial" panose="020B0604020202020204" pitchFamily="34" charset="0"/>
-              <a:buChar char="•"/>
-            </a:pPr>
-            <a:endParaRPr lang="en-GB" sz="1600" dirty="0"/>
-          </a:p>
-          <a:p>
-            <a:pPr marL="457200" indent="-457200">
-              <a:buFont typeface="Arial" panose="020B0604020202020204" pitchFamily="34" charset="0"/>
-              <a:buChar char="•"/>
-            </a:pPr>
-            <a:r>
-              <a:rPr lang="en-GB" sz="2800" dirty="0" smtClean="0"/>
-              <a:t>Python </a:t>
-            </a:r>
-            <a:r>
-              <a:rPr lang="en-GB" sz="2800" u="sng" dirty="0" smtClean="0">
-                <a:solidFill>
-                  <a:srgbClr val="0066CC"/>
-                </a:solidFill>
-              </a:rPr>
-              <a:t>https://docs.python.org/3/tutorial/index.html</a:t>
-            </a:r>
-            <a:endParaRPr lang="en-GB" sz="2800" u="sng" dirty="0" smtClean="0">
-              <a:solidFill>
-                <a:srgbClr val="0066CC"/>
-              </a:solidFill>
-            </a:endParaRPr>
-          </a:p>
-          <a:p>
-            <a:pPr marL="457200" indent="-457200">
-              <a:buFont typeface="Arial" panose="020B0604020202020204" pitchFamily="34" charset="0"/>
-              <a:buChar char="•"/>
-            </a:pPr>
-            <a:endParaRPr lang="en-GB" sz="1600" dirty="0"/>
-          </a:p>
-          <a:p>
-            <a:pPr marL="457200" indent="-457200">
-              <a:buFont typeface="Arial" panose="020B0604020202020204" pitchFamily="34" charset="0"/>
-              <a:buChar char="•"/>
-            </a:pPr>
-            <a:r>
-              <a:rPr lang="en-GB" sz="2800" dirty="0"/>
-              <a:t>Code academy </a:t>
-            </a:r>
-            <a:r>
-              <a:rPr lang="en-GB" sz="2800" dirty="0">
-                <a:hlinkClick r:id="rId3"/>
-              </a:rPr>
-              <a:t>http://</a:t>
-            </a:r>
-            <a:r>
-              <a:rPr lang="en-GB" sz="2800" dirty="0" smtClean="0">
-                <a:hlinkClick r:id="rId3"/>
-              </a:rPr>
-              <a:t>www.codecademy.com/en/tracks/python</a:t>
-            </a:r>
-            <a:r>
-              <a:rPr lang="en-GB" sz="2800" dirty="0" smtClean="0"/>
-              <a:t> </a:t>
-            </a:r>
-            <a:endParaRPr lang="en-GB" sz="2800" dirty="0"/>
-          </a:p>
-        </p:txBody>
-      </p:sp>
-    </p:spTree>
-    <p:extLst>
-      <p:ext uri="{BB962C8B-B14F-4D97-AF65-F5344CB8AC3E}">
-        <p14:creationId xmlns:p14="http://schemas.microsoft.com/office/powerpoint/2010/main" val="232019806"/>
       </p:ext>
     </p:extLst>
   </p:cSld>
@@ -9789,29 +9551,8 @@
             </a:r>
             <a:r>
               <a:rPr lang="en-GB" sz="2800" dirty="0" smtClean="0"/>
-              <a:t> numbers </a:t>
-            </a:r>
-            <a:r>
-              <a:rPr lang="en-GB" sz="2800" dirty="0" smtClean="0"/>
-              <a:t>(a decimal numbering system, which </a:t>
-            </a:r>
-            <a:r>
-              <a:rPr lang="en-GB" sz="2800" dirty="0" smtClean="0"/>
-              <a:t>in </a:t>
-            </a:r>
-            <a:r>
-              <a:rPr lang="en-GB" sz="2800" dirty="0" smtClean="0"/>
-              <a:t>turn originated </a:t>
-            </a:r>
-            <a:r>
-              <a:rPr lang="en-GB" sz="2800" dirty="0" smtClean="0"/>
-              <a:t>from Hindu scholars in </a:t>
-            </a:r>
-            <a:r>
-              <a:rPr lang="en-GB" sz="2800" dirty="0" smtClean="0"/>
-              <a:t>India)</a:t>
-            </a:r>
-            <a:endParaRPr lang="en-GB" sz="2800" dirty="0" smtClean="0"/>
+              <a:t> numbers (a decimal numbering system, which in turn originated from Hindu scholars in India)</a:t>
+            </a:r>
           </a:p>
           <a:p>
             <a:pPr marL="457200" indent="-457200">

</xml_diff>